<commit_message>
improved the location command, updated test cases and documentation
</commit_message>
<xml_diff>
--- a/docs/diagrams/LocationSequenceDiagram.pptx
+++ b/docs/diagrams/LocationSequenceDiagram.pptx
@@ -109,7 +109,7 @@
   </p:defaultTextStyle>
   <p:extLst>
     <p:ext uri="{EFAFB233-063F-42B5-8137-9DF3F51BA10A}">
-      <p15:sldGuideLst xmlns="" xmlns:p15="http://schemas.microsoft.com/office/powerpoint/2012/main">
+      <p15:sldGuideLst xmlns:p15="http://schemas.microsoft.com/office/powerpoint/2012/main" xmlns="">
         <p15:guide id="1" orient="horz" pos="1488">
           <p15:clr>
             <a:srgbClr val="A4A3A4"/>
@@ -213,7 +213,7 @@
             <a:fld id="{F5CC4B3F-88C1-4FFA-B1B6-F41C21DC6924}" type="datetimeFigureOut">
               <a:rPr lang="en-US" smtClean="0"/>
               <a:pPr/>
-              <a:t>10/30/2017</a:t>
+              <a:t>11/5/2017</a:t>
             </a:fld>
             <a:endParaRPr lang="en-US"/>
           </a:p>
@@ -381,7 +381,7 @@
     </p:spTree>
     <p:extLst>
       <p:ext uri="{BB962C8B-B14F-4D97-AF65-F5344CB8AC3E}">
-        <p14:creationId xmlns="" xmlns:p14="http://schemas.microsoft.com/office/powerpoint/2010/main" val="2023976206"/>
+        <p14:creationId xmlns:p14="http://schemas.microsoft.com/office/powerpoint/2010/main" xmlns="" val="2023976206"/>
       </p:ext>
     </p:extLst>
   </p:cSld>
@@ -661,7 +661,7 @@
             <a:fld id="{78C97017-6FC3-485B-9764-EAC9E56C1D49}" type="datetimeFigureOut">
               <a:rPr lang="en-US" smtClean="0"/>
               <a:pPr/>
-              <a:t>10/30/2017</a:t>
+              <a:t>11/5/2017</a:t>
             </a:fld>
             <a:endParaRPr lang="en-US"/>
           </a:p>
@@ -713,7 +713,7 @@
     </p:spTree>
     <p:extLst>
       <p:ext uri="{BB962C8B-B14F-4D97-AF65-F5344CB8AC3E}">
-        <p14:creationId xmlns="" xmlns:p14="http://schemas.microsoft.com/office/powerpoint/2010/main" val="3246593157"/>
+        <p14:creationId xmlns:p14="http://schemas.microsoft.com/office/powerpoint/2010/main" xmlns="" val="3246593157"/>
       </p:ext>
     </p:extLst>
   </p:cSld>
@@ -831,7 +831,7 @@
             <a:fld id="{78C97017-6FC3-485B-9764-EAC9E56C1D49}" type="datetimeFigureOut">
               <a:rPr lang="en-US" smtClean="0"/>
               <a:pPr/>
-              <a:t>10/30/2017</a:t>
+              <a:t>11/5/2017</a:t>
             </a:fld>
             <a:endParaRPr lang="en-US"/>
           </a:p>
@@ -883,7 +883,7 @@
     </p:spTree>
     <p:extLst>
       <p:ext uri="{BB962C8B-B14F-4D97-AF65-F5344CB8AC3E}">
-        <p14:creationId xmlns="" xmlns:p14="http://schemas.microsoft.com/office/powerpoint/2010/main" val="2707025021"/>
+        <p14:creationId xmlns:p14="http://schemas.microsoft.com/office/powerpoint/2010/main" xmlns="" val="2707025021"/>
       </p:ext>
     </p:extLst>
   </p:cSld>
@@ -1011,7 +1011,7 @@
             <a:fld id="{78C97017-6FC3-485B-9764-EAC9E56C1D49}" type="datetimeFigureOut">
               <a:rPr lang="en-US" smtClean="0"/>
               <a:pPr/>
-              <a:t>10/30/2017</a:t>
+              <a:t>11/5/2017</a:t>
             </a:fld>
             <a:endParaRPr lang="en-US"/>
           </a:p>
@@ -1063,7 +1063,7 @@
     </p:spTree>
     <p:extLst>
       <p:ext uri="{BB962C8B-B14F-4D97-AF65-F5344CB8AC3E}">
-        <p14:creationId xmlns="" xmlns:p14="http://schemas.microsoft.com/office/powerpoint/2010/main" val="568378986"/>
+        <p14:creationId xmlns:p14="http://schemas.microsoft.com/office/powerpoint/2010/main" xmlns="" val="568378986"/>
       </p:ext>
     </p:extLst>
   </p:cSld>
@@ -1181,7 +1181,7 @@
             <a:fld id="{78C97017-6FC3-485B-9764-EAC9E56C1D49}" type="datetimeFigureOut">
               <a:rPr lang="en-US" smtClean="0"/>
               <a:pPr/>
-              <a:t>10/30/2017</a:t>
+              <a:t>11/5/2017</a:t>
             </a:fld>
             <a:endParaRPr lang="en-US"/>
           </a:p>
@@ -1233,7 +1233,7 @@
     </p:spTree>
     <p:extLst>
       <p:ext uri="{BB962C8B-B14F-4D97-AF65-F5344CB8AC3E}">
-        <p14:creationId xmlns="" xmlns:p14="http://schemas.microsoft.com/office/powerpoint/2010/main" val="266658052"/>
+        <p14:creationId xmlns:p14="http://schemas.microsoft.com/office/powerpoint/2010/main" xmlns="" val="266658052"/>
       </p:ext>
     </p:extLst>
   </p:cSld>
@@ -1428,7 +1428,7 @@
             <a:fld id="{78C97017-6FC3-485B-9764-EAC9E56C1D49}" type="datetimeFigureOut">
               <a:rPr lang="en-US" smtClean="0"/>
               <a:pPr/>
-              <a:t>10/30/2017</a:t>
+              <a:t>11/5/2017</a:t>
             </a:fld>
             <a:endParaRPr lang="en-US"/>
           </a:p>
@@ -1480,7 +1480,7 @@
     </p:spTree>
     <p:extLst>
       <p:ext uri="{BB962C8B-B14F-4D97-AF65-F5344CB8AC3E}">
-        <p14:creationId xmlns="" xmlns:p14="http://schemas.microsoft.com/office/powerpoint/2010/main" val="474686344"/>
+        <p14:creationId xmlns:p14="http://schemas.microsoft.com/office/powerpoint/2010/main" xmlns="" val="474686344"/>
       </p:ext>
     </p:extLst>
   </p:cSld>
@@ -1715,7 +1715,7 @@
             <a:fld id="{78C97017-6FC3-485B-9764-EAC9E56C1D49}" type="datetimeFigureOut">
               <a:rPr lang="en-US" smtClean="0"/>
               <a:pPr/>
-              <a:t>10/30/2017</a:t>
+              <a:t>11/5/2017</a:t>
             </a:fld>
             <a:endParaRPr lang="en-US"/>
           </a:p>
@@ -1767,7 +1767,7 @@
     </p:spTree>
     <p:extLst>
       <p:ext uri="{BB962C8B-B14F-4D97-AF65-F5344CB8AC3E}">
-        <p14:creationId xmlns="" xmlns:p14="http://schemas.microsoft.com/office/powerpoint/2010/main" val="562293251"/>
+        <p14:creationId xmlns:p14="http://schemas.microsoft.com/office/powerpoint/2010/main" xmlns="" val="562293251"/>
       </p:ext>
     </p:extLst>
   </p:cSld>
@@ -2136,7 +2136,7 @@
             <a:fld id="{78C97017-6FC3-485B-9764-EAC9E56C1D49}" type="datetimeFigureOut">
               <a:rPr lang="en-US" smtClean="0"/>
               <a:pPr/>
-              <a:t>10/30/2017</a:t>
+              <a:t>11/5/2017</a:t>
             </a:fld>
             <a:endParaRPr lang="en-US"/>
           </a:p>
@@ -2188,7 +2188,7 @@
     </p:spTree>
     <p:extLst>
       <p:ext uri="{BB962C8B-B14F-4D97-AF65-F5344CB8AC3E}">
-        <p14:creationId xmlns="" xmlns:p14="http://schemas.microsoft.com/office/powerpoint/2010/main" val="1126424250"/>
+        <p14:creationId xmlns:p14="http://schemas.microsoft.com/office/powerpoint/2010/main" xmlns="" val="1126424250"/>
       </p:ext>
     </p:extLst>
   </p:cSld>
@@ -2255,7 +2255,7 @@
             <a:fld id="{78C97017-6FC3-485B-9764-EAC9E56C1D49}" type="datetimeFigureOut">
               <a:rPr lang="en-US" smtClean="0"/>
               <a:pPr/>
-              <a:t>10/30/2017</a:t>
+              <a:t>11/5/2017</a:t>
             </a:fld>
             <a:endParaRPr lang="en-US"/>
           </a:p>
@@ -2307,7 +2307,7 @@
     </p:spTree>
     <p:extLst>
       <p:ext uri="{BB962C8B-B14F-4D97-AF65-F5344CB8AC3E}">
-        <p14:creationId xmlns="" xmlns:p14="http://schemas.microsoft.com/office/powerpoint/2010/main" val="4159724230"/>
+        <p14:creationId xmlns:p14="http://schemas.microsoft.com/office/powerpoint/2010/main" xmlns="" val="4159724230"/>
       </p:ext>
     </p:extLst>
   </p:cSld>
@@ -2352,7 +2352,7 @@
             <a:fld id="{78C97017-6FC3-485B-9764-EAC9E56C1D49}" type="datetimeFigureOut">
               <a:rPr lang="en-US" smtClean="0"/>
               <a:pPr/>
-              <a:t>10/30/2017</a:t>
+              <a:t>11/5/2017</a:t>
             </a:fld>
             <a:endParaRPr lang="en-US"/>
           </a:p>
@@ -2404,7 +2404,7 @@
     </p:spTree>
     <p:extLst>
       <p:ext uri="{BB962C8B-B14F-4D97-AF65-F5344CB8AC3E}">
-        <p14:creationId xmlns="" xmlns:p14="http://schemas.microsoft.com/office/powerpoint/2010/main" val="1793928710"/>
+        <p14:creationId xmlns:p14="http://schemas.microsoft.com/office/powerpoint/2010/main" xmlns="" val="1793928710"/>
       </p:ext>
     </p:extLst>
   </p:cSld>
@@ -2629,7 +2629,7 @@
             <a:fld id="{78C97017-6FC3-485B-9764-EAC9E56C1D49}" type="datetimeFigureOut">
               <a:rPr lang="en-US" smtClean="0"/>
               <a:pPr/>
-              <a:t>10/30/2017</a:t>
+              <a:t>11/5/2017</a:t>
             </a:fld>
             <a:endParaRPr lang="en-US"/>
           </a:p>
@@ -2681,7 +2681,7 @@
     </p:spTree>
     <p:extLst>
       <p:ext uri="{BB962C8B-B14F-4D97-AF65-F5344CB8AC3E}">
-        <p14:creationId xmlns="" xmlns:p14="http://schemas.microsoft.com/office/powerpoint/2010/main" val="2076802089"/>
+        <p14:creationId xmlns:p14="http://schemas.microsoft.com/office/powerpoint/2010/main" xmlns="" val="2076802089"/>
       </p:ext>
     </p:extLst>
   </p:cSld>
@@ -2883,7 +2883,7 @@
             <a:fld id="{78C97017-6FC3-485B-9764-EAC9E56C1D49}" type="datetimeFigureOut">
               <a:rPr lang="en-US" smtClean="0"/>
               <a:pPr/>
-              <a:t>10/30/2017</a:t>
+              <a:t>11/5/2017</a:t>
             </a:fld>
             <a:endParaRPr lang="en-US"/>
           </a:p>
@@ -2935,7 +2935,7 @@
     </p:spTree>
     <p:extLst>
       <p:ext uri="{BB962C8B-B14F-4D97-AF65-F5344CB8AC3E}">
-        <p14:creationId xmlns="" xmlns:p14="http://schemas.microsoft.com/office/powerpoint/2010/main" val="201835938"/>
+        <p14:creationId xmlns:p14="http://schemas.microsoft.com/office/powerpoint/2010/main" xmlns="" val="201835938"/>
       </p:ext>
     </p:extLst>
   </p:cSld>
@@ -3096,7 +3096,7 @@
             <a:fld id="{78C97017-6FC3-485B-9764-EAC9E56C1D49}" type="datetimeFigureOut">
               <a:rPr lang="en-US" smtClean="0"/>
               <a:pPr/>
-              <a:t>10/30/2017</a:t>
+              <a:t>11/5/2017</a:t>
             </a:fld>
             <a:endParaRPr lang="en-US"/>
           </a:p>
@@ -3184,7 +3184,7 @@
     </p:spTree>
     <p:extLst>
       <p:ext uri="{BB962C8B-B14F-4D97-AF65-F5344CB8AC3E}">
-        <p14:creationId xmlns="" xmlns:p14="http://schemas.microsoft.com/office/powerpoint/2010/main" val="2341400630"/>
+        <p14:creationId xmlns:p14="http://schemas.microsoft.com/office/powerpoint/2010/main" xmlns="" val="2341400630"/>
       </p:ext>
     </p:extLst>
   </p:cSld>
@@ -3986,8 +3986,21 @@
                   <a:srgbClr val="0070C0"/>
                 </a:solidFill>
               </a:rPr>
-              <a:t>execute(“location INDEX”)</a:t>
-            </a:r>
+              <a:t>execute</a:t>
+            </a:r>
+            <a:r>
+              <a:rPr lang="en-US" sz="1700" dirty="0" smtClean="0">
+                <a:solidFill>
+                  <a:srgbClr val="0070C0"/>
+                </a:solidFill>
+              </a:rPr>
+              <a:t>(“map INDEXES”)</a:t>
+            </a:r>
+            <a:endParaRPr lang="en-US" sz="1700" dirty="0">
+              <a:solidFill>
+                <a:srgbClr val="0070C0"/>
+              </a:solidFill>
+            </a:endParaRPr>
           </a:p>
         </p:txBody>
       </p:sp>
@@ -4308,9 +4321,10 @@
               <a:t>parseCommand</a:t>
             </a:r>
             <a:r>
-              <a:rPr lang="en-US" sz="1700" dirty="0"/>
-              <a:t>(“location INDEX”)</a:t>
-            </a:r>
+              <a:rPr lang="en-US" sz="1700" dirty="0" smtClean="0"/>
+              <a:t>(“map INDEXES”)</a:t>
+            </a:r>
+            <a:endParaRPr lang="en-US" sz="1700" dirty="0"/>
           </a:p>
         </p:txBody>
       </p:sp>
@@ -4628,7 +4642,7 @@
           <p:cNvPr id="66" name="Straight Arrow Connector 65">
             <a:extLst>
               <a:ext uri="{FF2B5EF4-FFF2-40B4-BE49-F238E27FC236}">
-                <a16:creationId xmlns="" xmlns:a16="http://schemas.microsoft.com/office/drawing/2014/main" id="{39916E2E-195A-4DC8-B025-B05FA87E6796}"/>
+                <a16:creationId xmlns:a16="http://schemas.microsoft.com/office/drawing/2014/main" xmlns="" id="{39916E2E-195A-4DC8-B025-B05FA87E6796}"/>
               </a:ext>
             </a:extLst>
           </p:cNvPr>
@@ -4672,7 +4686,7 @@
           <p:cNvPr id="67" name="Straight Arrow Connector 66">
             <a:extLst>
               <a:ext uri="{FF2B5EF4-FFF2-40B4-BE49-F238E27FC236}">
-                <a16:creationId xmlns="" xmlns:a16="http://schemas.microsoft.com/office/drawing/2014/main" id="{D881596E-177C-4FDC-8E60-CAB90B3D5FAB}"/>
+                <a16:creationId xmlns:a16="http://schemas.microsoft.com/office/drawing/2014/main" xmlns="" id="{D881596E-177C-4FDC-8E60-CAB90B3D5FAB}"/>
               </a:ext>
             </a:extLst>
           </p:cNvPr>
@@ -4716,7 +4730,7 @@
           <p:cNvPr id="74" name="Straight Arrow Connector 73">
             <a:extLst>
               <a:ext uri="{FF2B5EF4-FFF2-40B4-BE49-F238E27FC236}">
-                <a16:creationId xmlns="" xmlns:a16="http://schemas.microsoft.com/office/drawing/2014/main" id="{854D9FBB-2B36-4DC9-8B58-F7F177A8E586}"/>
+                <a16:creationId xmlns:a16="http://schemas.microsoft.com/office/drawing/2014/main" xmlns="" id="{854D9FBB-2B36-4DC9-8B58-F7F177A8E586}"/>
               </a:ext>
             </a:extLst>
           </p:cNvPr>
@@ -4759,7 +4773,7 @@
           <p:cNvPr id="89" name="Straight Connector 88">
             <a:extLst>
               <a:ext uri="{FF2B5EF4-FFF2-40B4-BE49-F238E27FC236}">
-                <a16:creationId xmlns="" xmlns:a16="http://schemas.microsoft.com/office/drawing/2014/main" id="{E4E1C8CA-49DF-45D8-80A5-D5C8282EE927}"/>
+                <a16:creationId xmlns:a16="http://schemas.microsoft.com/office/drawing/2014/main" xmlns="" id="{E4E1C8CA-49DF-45D8-80A5-D5C8282EE927}"/>
               </a:ext>
             </a:extLst>
           </p:cNvPr>
@@ -4939,7 +4953,7 @@
           <p:cNvPr id="55" name="Straight Arrow Connector 54">
             <a:extLst>
               <a:ext uri="{FF2B5EF4-FFF2-40B4-BE49-F238E27FC236}">
-                <a16:creationId xmlns="" xmlns:a16="http://schemas.microsoft.com/office/drawing/2014/main" id="{854D9FBB-2B36-4DC9-8B58-F7F177A8E586}"/>
+                <a16:creationId xmlns:a16="http://schemas.microsoft.com/office/drawing/2014/main" xmlns="" id="{854D9FBB-2B36-4DC9-8B58-F7F177A8E586}"/>
               </a:ext>
             </a:extLst>
           </p:cNvPr>
@@ -5376,15 +5390,7 @@
                   <a:srgbClr val="7030A0"/>
                 </a:solidFill>
               </a:rPr>
-              <a:t>(p</a:t>
-            </a:r>
-            <a:r>
-              <a:rPr lang="en-US" sz="1700" dirty="0" smtClean="0">
-                <a:solidFill>
-                  <a:srgbClr val="7030A0"/>
-                </a:solidFill>
-              </a:rPr>
-              <a:t>)</a:t>
+              <a:t>(p)</a:t>
             </a:r>
             <a:endParaRPr lang="en-US" sz="1700" dirty="0">
               <a:solidFill>
@@ -5397,7 +5403,7 @@
     </p:spTree>
     <p:extLst>
       <p:ext uri="{BB962C8B-B14F-4D97-AF65-F5344CB8AC3E}">
-        <p14:creationId xmlns="" xmlns:p14="http://schemas.microsoft.com/office/powerpoint/2010/main" val="3945898909"/>
+        <p14:creationId xmlns:p14="http://schemas.microsoft.com/office/powerpoint/2010/main" xmlns="" val="3945898909"/>
       </p:ext>
     </p:extLst>
   </p:cSld>

</xml_diff>